<commit_message>
Update dump, pdf and ppt
</commit_message>
<xml_diff>
--- a/module-3/docker01/docker01.pptx
+++ b/module-3/docker01/docker01.pptx
@@ -217,7 +217,7 @@
           <a:p>
             <a:fld id="{AFD01546-198A-4195-BCF8-F0FF54C90E5E}" type="datetimeFigureOut">
               <a:rPr lang="en-US" smtClean="0"/>
-              <a:t>12/9/2020</a:t>
+              <a:t>12/10/2020</a:t>
             </a:fld>
             <a:endParaRPr lang="en-US" dirty="0"/>
           </a:p>
@@ -669,7 +669,7 @@
           <a:p>
             <a:fld id="{88D38747-4367-4BD2-8D51-C97E202738E2}" type="datetime1">
               <a:rPr lang="en-US" smtClean="0"/>
-              <a:t>12/9/2020</a:t>
+              <a:t>12/10/2020</a:t>
             </a:fld>
             <a:endParaRPr lang="en-US" dirty="0"/>
           </a:p>
@@ -974,7 +974,7 @@
           <a:p>
             <a:fld id="{11F1B079-7EF0-44EE-B798-BCC497C9F3B2}" type="datetime1">
               <a:rPr lang="en-US" smtClean="0"/>
-              <a:t>12/9/2020</a:t>
+              <a:t>12/10/2020</a:t>
             </a:fld>
             <a:endParaRPr lang="en-US" dirty="0"/>
           </a:p>
@@ -1168,7 +1168,7 @@
           <a:p>
             <a:fld id="{28FF70A8-1D13-4657-95F0-A9EA54967B8D}" type="datetime1">
               <a:rPr lang="en-US" smtClean="0"/>
-              <a:t>12/9/2020</a:t>
+              <a:t>12/10/2020</a:t>
             </a:fld>
             <a:endParaRPr lang="en-US" dirty="0"/>
           </a:p>
@@ -1431,7 +1431,7 @@
           <a:p>
             <a:fld id="{21EB90AC-71BD-4C7F-8ACA-7B3F18292E63}" type="datetime1">
               <a:rPr lang="en-US" smtClean="0"/>
-              <a:t>12/9/2020</a:t>
+              <a:t>12/10/2020</a:t>
             </a:fld>
             <a:endParaRPr lang="en-US" dirty="0"/>
           </a:p>
@@ -1867,7 +1867,7 @@
           <a:p>
             <a:fld id="{4E6EFC2C-8905-46F0-B443-CE905B76BA01}" type="datetime1">
               <a:rPr lang="en-US" smtClean="0"/>
-              <a:t>12/9/2020</a:t>
+              <a:t>12/10/2020</a:t>
             </a:fld>
             <a:endParaRPr lang="en-US" dirty="0"/>
           </a:p>
@@ -2404,7 +2404,7 @@
           <a:p>
             <a:fld id="{D9079DC3-C9B5-499E-9140-0DC28B7074E2}" type="datetime1">
               <a:rPr lang="en-US" smtClean="0"/>
-              <a:t>12/9/2020</a:t>
+              <a:t>12/10/2020</a:t>
             </a:fld>
             <a:endParaRPr lang="en-US" dirty="0"/>
           </a:p>
@@ -3286,7 +3286,7 @@
           <a:p>
             <a:fld id="{30BB33EA-E472-4D22-9C03-A9C14AA21CED}" type="datetime1">
               <a:rPr lang="en-US" smtClean="0"/>
-              <a:t>12/9/2020</a:t>
+              <a:t>12/10/2020</a:t>
             </a:fld>
             <a:endParaRPr lang="en-US" dirty="0"/>
           </a:p>
@@ -3456,7 +3456,7 @@
           <a:p>
             <a:fld id="{73C55A3C-5767-4844-A0A3-83778C2E5409}" type="datetime1">
               <a:rPr lang="en-US" smtClean="0"/>
-              <a:t>12/9/2020</a:t>
+              <a:t>12/10/2020</a:t>
             </a:fld>
             <a:endParaRPr lang="en-US" dirty="0"/>
           </a:p>
@@ -3700,7 +3700,7 @@
           <a:p>
             <a:fld id="{CAE507A8-A5CF-4D38-AB86-7EDDA87A85D4}" type="datetime1">
               <a:rPr lang="en-US" smtClean="0"/>
-              <a:t>12/9/2020</a:t>
+              <a:t>12/10/2020</a:t>
             </a:fld>
             <a:endParaRPr lang="en-US" dirty="0"/>
           </a:p>
@@ -3942,7 +3942,7 @@
           <a:p>
             <a:fld id="{BDFCD27C-8599-43EF-BA1D-14DDC1946E06}" type="datetime1">
               <a:rPr lang="en-US" smtClean="0"/>
-              <a:t>12/9/2020</a:t>
+              <a:t>12/10/2020</a:t>
             </a:fld>
             <a:endParaRPr lang="en-US" dirty="0"/>
           </a:p>
@@ -4425,7 +4425,7 @@
           <a:p>
             <a:fld id="{49343D99-809A-49C0-96E5-4250D0B498EE}" type="datetime1">
               <a:rPr lang="en-US" smtClean="0"/>
-              <a:t>12/9/2020</a:t>
+              <a:t>12/10/2020</a:t>
             </a:fld>
             <a:endParaRPr lang="en-US" dirty="0"/>
           </a:p>
@@ -4543,7 +4543,7 @@
           <a:p>
             <a:fld id="{A143DE9B-B678-4EFB-BB7D-A4370204A0B0}" type="datetime1">
               <a:rPr lang="en-US" smtClean="0"/>
-              <a:t>12/9/2020</a:t>
+              <a:t>12/10/2020</a:t>
             </a:fld>
             <a:endParaRPr lang="en-US" dirty="0"/>
           </a:p>
@@ -4638,7 +4638,7 @@
           <a:p>
             <a:fld id="{E68812DA-F765-4142-A6A3-A8ED7235E082}" type="datetime1">
               <a:rPr lang="en-US" smtClean="0"/>
-              <a:t>12/9/2020</a:t>
+              <a:t>12/10/2020</a:t>
             </a:fld>
             <a:endParaRPr lang="en-US" dirty="0"/>
           </a:p>
@@ -4893,7 +4893,7 @@
           <a:p>
             <a:fld id="{3E0277FD-7DE6-41D4-930D-AC99F5AFE54E}" type="datetime1">
               <a:rPr lang="en-US" smtClean="0"/>
-              <a:t>12/9/2020</a:t>
+              <a:t>12/10/2020</a:t>
             </a:fld>
             <a:endParaRPr lang="en-US" dirty="0"/>
           </a:p>
@@ -5200,7 +5200,7 @@
           <a:p>
             <a:fld id="{9EA15526-7079-4B7B-987C-1B5FAE11A0FF}" type="datetime1">
               <a:rPr lang="en-US" smtClean="0"/>
-              <a:t>12/9/2020</a:t>
+              <a:t>12/10/2020</a:t>
             </a:fld>
             <a:endParaRPr lang="en-US" dirty="0"/>
           </a:p>
@@ -5435,7 +5435,7 @@
           <a:p>
             <a:fld id="{073ED0CC-082F-4160-86E5-0D6041F12778}" type="datetime1">
               <a:rPr lang="en-US" smtClean="0"/>
-              <a:t>12/9/2020</a:t>
+              <a:t>12/10/2020</a:t>
             </a:fld>
             <a:endParaRPr lang="en-US" dirty="0"/>
           </a:p>
@@ -12158,21 +12158,21 @@
 </file>
 
 <file path=customXml/item1.xml><?xml version="1.0" encoding="utf-8"?>
+<?mso-contentType ?>
+<FormTemplates xmlns="http://schemas.microsoft.com/sharepoint/v3/contenttype/forms">
+  <Display>DocumentLibraryForm</Display>
+  <Edit>DocumentLibraryForm</Edit>
+  <New>DocumentLibraryForm</New>
+</FormTemplates>
+</file>
+
+<file path=customXml/item2.xml><?xml version="1.0" encoding="utf-8"?>
 <p:properties xmlns:p="http://schemas.microsoft.com/office/2006/metadata/properties" xmlns:xsi="http://www.w3.org/2001/XMLSchema-instance" xmlns:pc="http://schemas.microsoft.com/office/infopath/2007/PartnerControls">
   <documentManagement>
     <Status xmlns="71af3243-3dd4-4a8d-8c0d-dd76da1f02a5">Not started</Status>
     <MediaServiceKeyPoints xmlns="71af3243-3dd4-4a8d-8c0d-dd76da1f02a5" xsi:nil="true"/>
   </documentManagement>
 </p:properties>
-</file>
-
-<file path=customXml/item2.xml><?xml version="1.0" encoding="utf-8"?>
-<?mso-contentType ?>
-<FormTemplates xmlns="http://schemas.microsoft.com/sharepoint/v3/contenttype/forms">
-  <Display>DocumentLibraryForm</Display>
-  <Edit>DocumentLibraryForm</Edit>
-  <New>DocumentLibraryForm</New>
-</FormTemplates>
 </file>
 
 <file path=customXml/item3.xml><?xml version="1.0" encoding="utf-8"?>
@@ -12397,19 +12397,19 @@
 </file>
 
 <file path=customXml/itemProps1.xml><?xml version="1.0" encoding="utf-8"?>
+<ds:datastoreItem xmlns:ds="http://schemas.openxmlformats.org/officeDocument/2006/customXml" ds:itemID="{64B270AB-C138-415C-897E-3C24487DECF1}">
+  <ds:schemaRefs>
+    <ds:schemaRef ds:uri="http://schemas.microsoft.com/sharepoint/v3/contenttype/forms"/>
+  </ds:schemaRefs>
+</ds:datastoreItem>
+</file>
+
+<file path=customXml/itemProps2.xml><?xml version="1.0" encoding="utf-8"?>
 <ds:datastoreItem xmlns:ds="http://schemas.openxmlformats.org/officeDocument/2006/customXml" ds:itemID="{2C4C00F4-06E9-43E3-AD97-88A857CEFA82}">
   <ds:schemaRefs>
     <ds:schemaRef ds:uri="http://schemas.microsoft.com/office/2006/metadata/properties"/>
     <ds:schemaRef ds:uri="http://schemas.microsoft.com/office/infopath/2007/PartnerControls"/>
     <ds:schemaRef ds:uri="71af3243-3dd4-4a8d-8c0d-dd76da1f02a5"/>
-  </ds:schemaRefs>
-</ds:datastoreItem>
-</file>
-
-<file path=customXml/itemProps2.xml><?xml version="1.0" encoding="utf-8"?>
-<ds:datastoreItem xmlns:ds="http://schemas.openxmlformats.org/officeDocument/2006/customXml" ds:itemID="{64B270AB-C138-415C-897E-3C24487DECF1}">
-  <ds:schemaRefs>
-    <ds:schemaRef ds:uri="http://schemas.microsoft.com/sharepoint/v3/contenttype/forms"/>
   </ds:schemaRefs>
 </ds:datastoreItem>
 </file>

</xml_diff>